<commit_message>
git picture & lazy image
</commit_message>
<xml_diff>
--- a/前端性能.pptx
+++ b/前端性能.pptx
@@ -4227,7 +4227,7 @@
         <p:spPr>
           <a:xfrm>
             <a:off x="6381750" y="4114800"/>
-            <a:ext cx="5286375" cy="2308324"/>
+            <a:ext cx="5628005" cy="2306955"/>
           </a:xfrm>
           <a:prstGeom prst="rect">
             <a:avLst/>
@@ -4629,7 +4629,7 @@
         </p:blipFill>
         <p:spPr bwMode="auto">
           <a:xfrm>
-            <a:off x="5776913" y="1404938"/>
+            <a:off x="6164263" y="1404938"/>
             <a:ext cx="5762625" cy="3305175"/>
           </a:xfrm>
           <a:prstGeom prst="rect">
@@ -4649,131 +4649,6 @@
       </p:pic>
       <p:sp>
         <p:nvSpPr>
-          <p:cNvPr id="4" name="文本框 3"/>
-          <p:cNvSpPr txBox="1"/>
-          <p:nvPr/>
-        </p:nvSpPr>
-        <p:spPr>
-          <a:xfrm>
-            <a:off x="838200" y="1733550"/>
-            <a:ext cx="4400550" cy="2806025"/>
-          </a:xfrm>
-          <a:prstGeom prst="rect">
-            <a:avLst/>
-          </a:prstGeom>
-          <a:noFill/>
-        </p:spPr>
-        <p:txBody>
-          <a:bodyPr wrap="square" rtlCol="0">
-            <a:spAutoFit/>
-          </a:bodyPr>
-          <a:lstStyle/>
-          <a:p>
-            <a:pPr marL="285750" indent="-285750">
-              <a:lnSpc>
-                <a:spcPct val="150000"/>
-              </a:lnSpc>
-              <a:buFont typeface="Wingdings" panose="05000000000000000000" pitchFamily="2" charset="2"/>
-              <a:buChar char="Ø"/>
-            </a:pPr>
-            <a:r>
-              <a:rPr lang="zh-CN" altLang="en-US" sz="2400" dirty="0"/>
-              <a:t>尽可能利用 </a:t>
-            </a:r>
-            <a:r>
-              <a:rPr lang="en-US" altLang="zh-CN" sz="2400" dirty="0"/>
-              <a:t>CSS3 </a:t>
-            </a:r>
-            <a:r>
-              <a:rPr lang="zh-CN" altLang="en-US" sz="2400" dirty="0"/>
-              <a:t>效果</a:t>
-            </a:r>
-            <a:endParaRPr lang="en-US" altLang="zh-CN" sz="2400" dirty="0"/>
-          </a:p>
-          <a:p>
-            <a:pPr marL="285750" indent="-285750">
-              <a:lnSpc>
-                <a:spcPct val="150000"/>
-              </a:lnSpc>
-              <a:buFont typeface="Wingdings" panose="05000000000000000000" pitchFamily="2" charset="2"/>
-              <a:buChar char="Ø"/>
-            </a:pPr>
-            <a:r>
-              <a:rPr lang="zh-CN" altLang="en-US" sz="2400" dirty="0"/>
-              <a:t>使用网页字体</a:t>
-            </a:r>
-            <a:endParaRPr lang="en-US" altLang="zh-CN" sz="2400" dirty="0"/>
-          </a:p>
-          <a:p>
-            <a:pPr marL="285750" indent="-285750">
-              <a:lnSpc>
-                <a:spcPct val="150000"/>
-              </a:lnSpc>
-              <a:buFont typeface="Wingdings" panose="05000000000000000000" pitchFamily="2" charset="2"/>
-              <a:buChar char="Ø"/>
-            </a:pPr>
-            <a:r>
-              <a:rPr lang="zh-CN" altLang="en-US" sz="2400" dirty="0"/>
-              <a:t>优先使用</a:t>
-            </a:r>
-            <a:r>
-              <a:rPr lang="en-US" altLang="zh-CN" sz="2400" dirty="0"/>
-              <a:t> </a:t>
-            </a:r>
-            <a:r>
-              <a:rPr lang="en-US" altLang="zh-CN" sz="2400" dirty="0" err="1"/>
-              <a:t>WebP</a:t>
-            </a:r>
-            <a:r>
-              <a:rPr lang="en-US" altLang="zh-CN" sz="2400" dirty="0"/>
-              <a:t> </a:t>
-            </a:r>
-            <a:r>
-              <a:rPr lang="zh-CN" altLang="en-US" sz="2400" dirty="0"/>
-              <a:t>和 </a:t>
-            </a:r>
-            <a:r>
-              <a:rPr lang="en-US" altLang="zh-CN" sz="2400" dirty="0"/>
-              <a:t>JPEG XR</a:t>
-            </a:r>
-            <a:endParaRPr lang="en-US" altLang="zh-CN" sz="2400" dirty="0"/>
-          </a:p>
-          <a:p>
-            <a:pPr marL="285750" indent="-285750">
-              <a:lnSpc>
-                <a:spcPct val="150000"/>
-              </a:lnSpc>
-              <a:buFont typeface="Wingdings" panose="05000000000000000000" pitchFamily="2" charset="2"/>
-              <a:buChar char="Ø"/>
-            </a:pPr>
-            <a:r>
-              <a:rPr lang="zh-CN" altLang="en-US" sz="2400" dirty="0"/>
-              <a:t>用视频代替动画</a:t>
-            </a:r>
-            <a:r>
-              <a:rPr lang="en-US" altLang="zh-CN" sz="2400" dirty="0"/>
-              <a:t>gif</a:t>
-            </a:r>
-            <a:endParaRPr lang="en-US" altLang="zh-CN" sz="2400" dirty="0"/>
-          </a:p>
-          <a:p>
-            <a:pPr marL="285750" indent="-285750">
-              <a:lnSpc>
-                <a:spcPct val="150000"/>
-              </a:lnSpc>
-              <a:buFont typeface="Wingdings" panose="05000000000000000000" pitchFamily="2" charset="2"/>
-              <a:buChar char="Ø"/>
-            </a:pPr>
-            <a:r>
-              <a:rPr lang="zh-CN" altLang="en-US" sz="2400" dirty="0"/>
-              <a:t>延迟加载图像和视频</a:t>
-            </a:r>
-            <a:endParaRPr lang="zh-CN" altLang="en-US" sz="2400" dirty="0"/>
-          </a:p>
-        </p:txBody>
-      </p:sp>
-      <p:sp>
-        <p:nvSpPr>
           <p:cNvPr id="5" name="矩形 4"/>
           <p:cNvSpPr/>
           <p:nvPr/>
@@ -4821,6 +4696,269 @@
           </a:p>
         </p:txBody>
       </p:sp>
+      <p:grpSp>
+        <p:nvGrpSpPr>
+          <p:cNvPr id="7" name="组合 6"/>
+          <p:cNvGrpSpPr/>
+          <p:nvPr/>
+        </p:nvGrpSpPr>
+        <p:grpSpPr>
+          <a:xfrm>
+            <a:off x="898525" y="1310640"/>
+            <a:ext cx="5196840" cy="3519805"/>
+            <a:chOff x="1415" y="1874"/>
+            <a:chExt cx="8184" cy="5543"/>
+          </a:xfrm>
+        </p:grpSpPr>
+        <p:sp>
+          <p:nvSpPr>
+            <p:cNvPr id="4" name="文本框 3"/>
+            <p:cNvSpPr txBox="1"/>
+            <p:nvPr/>
+          </p:nvSpPr>
+          <p:spPr>
+            <a:xfrm>
+              <a:off x="1415" y="1874"/>
+              <a:ext cx="6930" cy="4797"/>
+            </a:xfrm>
+            <a:prstGeom prst="rect">
+              <a:avLst/>
+            </a:prstGeom>
+            <a:noFill/>
+          </p:spPr>
+          <p:txBody>
+            <a:bodyPr wrap="square" rtlCol="0">
+              <a:spAutoFit/>
+            </a:bodyPr>
+            <a:lstStyle/>
+            <a:p>
+              <a:pPr marL="285750" indent="-285750">
+                <a:lnSpc>
+                  <a:spcPct val="100000"/>
+                </a:lnSpc>
+                <a:buFont typeface="Wingdings" panose="05000000000000000000" pitchFamily="2" charset="2"/>
+                <a:buChar char="Ø"/>
+              </a:pPr>
+              <a:r>
+                <a:rPr lang="zh-CN" altLang="en-US" sz="2400" dirty="0"/>
+                <a:t>尽可能利用 </a:t>
+              </a:r>
+              <a:r>
+                <a:rPr lang="en-US" altLang="zh-CN" sz="2400" dirty="0"/>
+                <a:t>CSS3 </a:t>
+              </a:r>
+              <a:r>
+                <a:rPr lang="zh-CN" altLang="en-US" sz="2400" dirty="0"/>
+                <a:t>效果</a:t>
+              </a:r>
+              <a:endParaRPr lang="en-US" altLang="zh-CN" sz="2400" dirty="0"/>
+            </a:p>
+            <a:p>
+              <a:pPr marL="285750" indent="-285750">
+                <a:lnSpc>
+                  <a:spcPct val="100000"/>
+                </a:lnSpc>
+                <a:buFont typeface="Wingdings" panose="05000000000000000000" pitchFamily="2" charset="2"/>
+                <a:buChar char="Ø"/>
+              </a:pPr>
+              <a:r>
+                <a:rPr lang="zh-CN" altLang="en-US" sz="2400" dirty="0"/>
+                <a:t>使用网页字体</a:t>
+              </a:r>
+              <a:endParaRPr lang="en-US" altLang="zh-CN" sz="2400" dirty="0"/>
+            </a:p>
+            <a:p>
+              <a:pPr marL="285750" indent="-285750">
+                <a:lnSpc>
+                  <a:spcPct val="100000"/>
+                </a:lnSpc>
+                <a:buFont typeface="Wingdings" panose="05000000000000000000" pitchFamily="2" charset="2"/>
+                <a:buChar char="Ø"/>
+              </a:pPr>
+              <a:r>
+                <a:rPr lang="zh-CN" altLang="en-US" sz="2400" dirty="0"/>
+                <a:t>优先使用</a:t>
+              </a:r>
+              <a:r>
+                <a:rPr lang="en-US" altLang="zh-CN" sz="2400" dirty="0"/>
+                <a:t> </a:t>
+              </a:r>
+              <a:r>
+                <a:rPr lang="en-US" altLang="zh-CN" sz="2400" dirty="0" err="1"/>
+                <a:t>WebP</a:t>
+              </a:r>
+              <a:r>
+                <a:rPr lang="en-US" altLang="zh-CN" sz="2400" dirty="0"/>
+                <a:t> </a:t>
+              </a:r>
+              <a:r>
+                <a:rPr lang="zh-CN" altLang="en-US" sz="2400" dirty="0"/>
+                <a:t>和 </a:t>
+              </a:r>
+              <a:r>
+                <a:rPr lang="en-US" altLang="zh-CN" sz="2400" dirty="0"/>
+                <a:t>JPEG XR</a:t>
+              </a:r>
+              <a:endParaRPr lang="en-US" altLang="zh-CN" sz="2400" dirty="0"/>
+            </a:p>
+            <a:p>
+              <a:pPr marL="285750" indent="-285750">
+                <a:lnSpc>
+                  <a:spcPct val="100000"/>
+                </a:lnSpc>
+                <a:buFont typeface="Wingdings" panose="05000000000000000000" pitchFamily="2" charset="2"/>
+                <a:buChar char="Ø"/>
+              </a:pPr>
+              <a:endParaRPr lang="en-US" altLang="zh-CN" sz="2400" dirty="0"/>
+            </a:p>
+            <a:p>
+              <a:pPr indent="0">
+                <a:lnSpc>
+                  <a:spcPct val="100000"/>
+                </a:lnSpc>
+                <a:buFont typeface="Wingdings" panose="05000000000000000000" pitchFamily="2" charset="2"/>
+                <a:buNone/>
+              </a:pPr>
+              <a:endParaRPr lang="en-US" altLang="zh-CN" sz="2400" dirty="0"/>
+            </a:p>
+            <a:p>
+              <a:pPr indent="0">
+                <a:lnSpc>
+                  <a:spcPct val="100000"/>
+                </a:lnSpc>
+                <a:buFont typeface="Wingdings" panose="05000000000000000000" pitchFamily="2" charset="2"/>
+                <a:buNone/>
+              </a:pPr>
+              <a:endParaRPr lang="en-US" altLang="zh-CN" sz="2400" dirty="0"/>
+            </a:p>
+            <a:p>
+              <a:pPr marL="285750" indent="-285750">
+                <a:lnSpc>
+                  <a:spcPct val="100000"/>
+                </a:lnSpc>
+                <a:buFont typeface="Wingdings" panose="05000000000000000000" pitchFamily="2" charset="2"/>
+                <a:buChar char="Ø"/>
+              </a:pPr>
+              <a:r>
+                <a:rPr lang="zh-CN" altLang="en-US" sz="2400" dirty="0"/>
+                <a:t>用视频代替动画</a:t>
+              </a:r>
+              <a:r>
+                <a:rPr lang="en-US" altLang="zh-CN" sz="2400" dirty="0"/>
+                <a:t>gif</a:t>
+              </a:r>
+              <a:endParaRPr lang="en-US" altLang="zh-CN" sz="2400" dirty="0"/>
+            </a:p>
+            <a:p>
+              <a:pPr marL="285750" indent="-285750">
+                <a:lnSpc>
+                  <a:spcPct val="100000"/>
+                </a:lnSpc>
+                <a:buFont typeface="Wingdings" panose="05000000000000000000" pitchFamily="2" charset="2"/>
+                <a:buChar char="Ø"/>
+              </a:pPr>
+              <a:r>
+                <a:rPr lang="zh-CN" altLang="en-US" sz="2400" dirty="0"/>
+                <a:t>延迟加载图像和视频</a:t>
+              </a:r>
+              <a:endParaRPr lang="zh-CN" altLang="en-US" sz="2400" dirty="0"/>
+            </a:p>
+          </p:txBody>
+        </p:sp>
+        <p:sp>
+          <p:nvSpPr>
+            <p:cNvPr id="3" name="文本框 2"/>
+            <p:cNvSpPr txBox="1"/>
+            <p:nvPr/>
+          </p:nvSpPr>
+          <p:spPr>
+            <a:xfrm>
+              <a:off x="2095" y="6693"/>
+              <a:ext cx="7505" cy="725"/>
+            </a:xfrm>
+            <a:prstGeom prst="rect">
+              <a:avLst/>
+            </a:prstGeom>
+            <a:noFill/>
+          </p:spPr>
+          <p:txBody>
+            <a:bodyPr wrap="square" rtlCol="0" anchor="t">
+              <a:spAutoFit/>
+            </a:bodyPr>
+            <a:p>
+              <a:r>
+                <a:rPr lang="zh-CN" altLang="en-US" sz="1200"/>
+                <a:t>&lt;img src="celebration.jpg" loading="lazy" alt="..." /&gt;</a:t>
+              </a:r>
+              <a:endParaRPr lang="zh-CN" altLang="en-US" sz="1200"/>
+            </a:p>
+            <a:p>
+              <a:r>
+                <a:rPr lang="zh-CN" altLang="en-US" sz="1200"/>
+                <a:t>Feature detection  'loading' in HTMLImageElement.prototype</a:t>
+              </a:r>
+              <a:endParaRPr lang="zh-CN" altLang="en-US" sz="1200"/>
+            </a:p>
+          </p:txBody>
+        </p:sp>
+        <p:sp>
+          <p:nvSpPr>
+            <p:cNvPr id="6" name="文本框 5"/>
+            <p:cNvSpPr txBox="1"/>
+            <p:nvPr/>
+          </p:nvSpPr>
+          <p:spPr>
+            <a:xfrm>
+              <a:off x="2095" y="3661"/>
+              <a:ext cx="7086" cy="1598"/>
+            </a:xfrm>
+            <a:prstGeom prst="rect">
+              <a:avLst/>
+            </a:prstGeom>
+            <a:noFill/>
+          </p:spPr>
+          <p:txBody>
+            <a:bodyPr wrap="square" rtlCol="0" anchor="t">
+              <a:spAutoFit/>
+            </a:bodyPr>
+            <a:p>
+              <a:r>
+                <a:rPr lang="zh-CN" altLang="en-US" sz="1200"/>
+                <a:t>&lt;picture&gt;</a:t>
+              </a:r>
+              <a:endParaRPr lang="zh-CN" altLang="en-US" sz="1200"/>
+            </a:p>
+            <a:p>
+              <a:r>
+                <a:rPr lang="zh-CN" altLang="en-US" sz="1200"/>
+                <a:t>    &lt;source type="image/webp" srcset="flower.webp"&gt;</a:t>
+              </a:r>
+              <a:endParaRPr lang="zh-CN" altLang="en-US" sz="1200"/>
+            </a:p>
+            <a:p>
+              <a:r>
+                <a:rPr lang="zh-CN" altLang="en-US" sz="1200"/>
+                <a:t>    &lt;source type="image/jpeg" srcset="flower.jpg"&gt;</a:t>
+              </a:r>
+              <a:endParaRPr lang="zh-CN" altLang="en-US" sz="1200"/>
+            </a:p>
+            <a:p>
+              <a:r>
+                <a:rPr lang="zh-CN" altLang="en-US" sz="1200"/>
+                <a:t>    &lt;img src="flower.jpg" alt=""&gt;</a:t>
+              </a:r>
+              <a:endParaRPr lang="zh-CN" altLang="en-US" sz="1200"/>
+            </a:p>
+            <a:p>
+              <a:r>
+                <a:rPr lang="zh-CN" altLang="en-US" sz="1200"/>
+                <a:t>&lt;/picture&gt;</a:t>
+              </a:r>
+              <a:endParaRPr lang="zh-CN" altLang="en-US" sz="1200"/>
+            </a:p>
+          </p:txBody>
+        </p:sp>
+      </p:grpSp>
     </p:spTree>
   </p:cSld>
   <p:clrMapOvr>
@@ -4887,7 +5025,12 @@
             <p:ph idx="1"/>
           </p:nvPr>
         </p:nvSpPr>
-        <p:spPr/>
+        <p:spPr>
+          <a:xfrm>
+            <a:off x="335280" y="1825625"/>
+            <a:ext cx="11481435" cy="3526790"/>
+          </a:xfrm>
+        </p:spPr>
         <p:txBody>
           <a:bodyPr/>
           <a:lstStyle/>
@@ -4921,7 +5064,7 @@
             </a:pPr>
             <a:r>
               <a:rPr lang="en-US" altLang="zh-CN" dirty="0"/>
-              <a:t>	      </a:t>
+              <a:t>	    </a:t>
             </a:r>
             <a:r>
               <a:rPr lang="zh-CN" altLang="en-US" dirty="0"/>
@@ -4942,6 +5085,36 @@
             <a:r>
               <a:rPr lang="en-US" altLang="zh-CN" dirty="0" err="1"/>
               <a:t>ba</a:t>
+            </a:r>
+            <a:endParaRPr lang="en-US" altLang="zh-CN" dirty="0" err="1"/>
+          </a:p>
+          <a:p>
+            <a:pPr marL="0" indent="0">
+              <a:buNone/>
+            </a:pPr>
+            <a:r>
+              <a:rPr lang="en-US" altLang="zh-CN" dirty="0" err="1"/>
+              <a:t>atob btoa</a:t>
+            </a:r>
+            <a:endParaRPr lang="en-US" altLang="zh-CN" dirty="0" err="1"/>
+          </a:p>
+          <a:p>
+            <a:pPr marL="0" indent="0">
+              <a:buNone/>
+            </a:pPr>
+            <a:r>
+              <a:rPr lang="en-US" altLang="zh-CN" sz="1200" dirty="0" err="1"/>
+              <a:t> &lt;a href="&amp;#106;&amp;#97;&amp;#118;&amp;#97;&amp;#115;&amp;#99;&amp;#114;&amp;#105;&amp;#112;&amp;#116;&amp;#58;&amp;#97;&amp;#108;&amp;#101;&amp;#114;&amp;#116;&amp;#40;&amp;#39;&amp;#88;&amp;#83;&amp;#83;&amp;#39;&amp;#41;"&gt;dada&lt;/a&gt;</a:t>
+            </a:r>
+            <a:endParaRPr lang="en-US" altLang="zh-CN" sz="1200" dirty="0" err="1"/>
+          </a:p>
+          <a:p>
+            <a:pPr marL="0" indent="0">
+              <a:buNone/>
+            </a:pPr>
+            <a:r>
+              <a:rPr lang="en-US" altLang="zh-CN" dirty="0" err="1"/>
+              <a:t>escape vs encodeURL vs encodeURLComponent</a:t>
             </a:r>
             <a:endParaRPr lang="zh-CN" altLang="en-US" dirty="0"/>
           </a:p>
@@ -4961,7 +5134,7 @@
         </p:nvSpPr>
         <p:spPr>
           <a:xfrm>
-            <a:off x="838200" y="6148388"/>
+            <a:off x="335280" y="6155373"/>
             <a:ext cx="9915525" cy="369332"/>
           </a:xfrm>
           <a:prstGeom prst="rect">
@@ -5289,7 +5462,7 @@
         <p:spPr>
           <a:xfrm>
             <a:off x="304800" y="2152650"/>
-            <a:ext cx="5260340" cy="2553335"/>
+            <a:ext cx="5260340" cy="3046095"/>
           </a:xfrm>
           <a:prstGeom prst="rect">
             <a:avLst/>
@@ -5306,6 +5479,9 @@
               <a:rPr lang="en-US" altLang="zh-CN" sz="3200" dirty="0" err="1"/>
               <a:t>String.prototype.repeat</a:t>
             </a:r>
+            <a:endParaRPr lang="en-US" altLang="zh-CN" sz="3200" dirty="0" err="1"/>
+          </a:p>
+          <a:p>
             <a:endParaRPr lang="en-US" altLang="zh-CN" sz="3200" dirty="0"/>
           </a:p>
           <a:p>

</xml_diff>